<commit_message>
Update Milestone 1 Report
</commit_message>
<xml_diff>
--- a/Documents/Milestone 1.pptx
+++ b/Documents/Milestone 1.pptx
@@ -6,15 +6,17 @@
   </p:sldMasterIdLst>
   <p:sldIdLst>
     <p:sldId id="256" r:id="rId2"/>
-    <p:sldId id="257" r:id="rId3"/>
-    <p:sldId id="258" r:id="rId4"/>
-    <p:sldId id="259" r:id="rId5"/>
-    <p:sldId id="260" r:id="rId6"/>
-    <p:sldId id="261" r:id="rId7"/>
-    <p:sldId id="262" r:id="rId8"/>
-    <p:sldId id="263" r:id="rId9"/>
-    <p:sldId id="264" r:id="rId10"/>
-    <p:sldId id="265" r:id="rId11"/>
+    <p:sldId id="267" r:id="rId3"/>
+    <p:sldId id="257" r:id="rId4"/>
+    <p:sldId id="258" r:id="rId5"/>
+    <p:sldId id="259" r:id="rId6"/>
+    <p:sldId id="260" r:id="rId7"/>
+    <p:sldId id="261" r:id="rId8"/>
+    <p:sldId id="262" r:id="rId9"/>
+    <p:sldId id="263" r:id="rId10"/>
+    <p:sldId id="264" r:id="rId11"/>
+    <p:sldId id="265" r:id="rId12"/>
+    <p:sldId id="266" r:id="rId13"/>
   </p:sldIdLst>
   <p:sldSz cx="12192000" cy="6858000"/>
   <p:notesSz cx="6858000" cy="9144000"/>
@@ -113,6 +115,11 @@
       </a:defRPr>
     </a:lvl9pPr>
   </p:defaultTextStyle>
+  <p:extLst>
+    <p:ext uri="{EFAFB233-063F-42B5-8137-9DF3F51BA10A}">
+      <p15:sldGuideLst xmlns:p15="http://schemas.microsoft.com/office/powerpoint/2012/main"/>
+    </p:ext>
+  </p:extLst>
 </p:presentation>
 </file>
 
@@ -259,7 +266,7 @@
           <a:p>
             <a:fld id="{2395C5C9-164C-46B3-A87E-7660D39D3106}" type="datetime2">
               <a:rPr lang="en-US" smtClean="0"/>
-              <a:t>Saturday, November 30, 2024</a:t>
+              <a:t>Monday, December 2, 2024</a:t>
             </a:fld>
             <a:endParaRPr lang="en-US" dirty="0"/>
           </a:p>
@@ -462,7 +469,7 @@
           <a:p>
             <a:fld id="{5B75179A-1E2B-41AB-B400-4F1B4022FAEE}" type="datetime2">
               <a:rPr lang="en-US" smtClean="0"/>
-              <a:t>Saturday, November 30, 2024</a:t>
+              <a:t>Monday, December 2, 2024</a:t>
             </a:fld>
             <a:endParaRPr lang="en-US"/>
           </a:p>
@@ -675,7 +682,7 @@
           <a:p>
             <a:fld id="{05681D0F-6595-4F14-8EF3-954CD87C797B}" type="datetime2">
               <a:rPr lang="en-US" smtClean="0"/>
-              <a:t>Saturday, November 30, 2024</a:t>
+              <a:t>Monday, December 2, 2024</a:t>
             </a:fld>
             <a:endParaRPr lang="en-US"/>
           </a:p>
@@ -877,7 +884,7 @@
           <a:p>
             <a:fld id="{4DDCFF8A-AAF8-4A12-8A91-9CA0EAF6CBB9}" type="datetime2">
               <a:rPr lang="en-US" smtClean="0"/>
-              <a:t>Saturday, November 30, 2024</a:t>
+              <a:t>Monday, December 2, 2024</a:t>
             </a:fld>
             <a:endParaRPr lang="en-US" dirty="0"/>
           </a:p>
@@ -1156,7 +1163,7 @@
           <a:p>
             <a:fld id="{ABCC25C3-021A-4B0B-8F70-0C181FE1CF45}" type="datetime2">
               <a:rPr lang="en-US" smtClean="0"/>
-              <a:t>Saturday, November 30, 2024</a:t>
+              <a:t>Monday, December 2, 2024</a:t>
             </a:fld>
             <a:endParaRPr lang="en-US"/>
           </a:p>
@@ -1416,7 +1423,7 @@
           <a:p>
             <a:fld id="{0C23D88D-8CEC-4ED9-A53B-5596187D9A16}" type="datetime2">
               <a:rPr lang="en-US" smtClean="0"/>
-              <a:t>Saturday, November 30, 2024</a:t>
+              <a:t>Monday, December 2, 2024</a:t>
             </a:fld>
             <a:endParaRPr lang="en-US"/>
           </a:p>
@@ -1832,7 +1839,7 @@
           <a:p>
             <a:fld id="{D2CCD382-DFDA-4722-A27A-59C21AD112F2}" type="datetime2">
               <a:rPr lang="en-US" smtClean="0"/>
-              <a:t>Saturday, November 30, 2024</a:t>
+              <a:t>Monday, December 2, 2024</a:t>
             </a:fld>
             <a:endParaRPr lang="en-US"/>
           </a:p>
@@ -1977,7 +1984,7 @@
           <a:p>
             <a:fld id="{22F2A30D-1C09-413F-AAB1-38F366000715}" type="datetime2">
               <a:rPr lang="en-US" smtClean="0"/>
-              <a:t>Saturday, November 30, 2024</a:t>
+              <a:t>Monday, December 2, 2024</a:t>
             </a:fld>
             <a:endParaRPr lang="en-US"/>
           </a:p>
@@ -2099,7 +2106,7 @@
           <a:p>
             <a:fld id="{6DB82B9C-D65E-4F64-95C3-B10F3B00F0D9}" type="datetime2">
               <a:rPr lang="en-US" smtClean="0"/>
-              <a:t>Saturday, November 30, 2024</a:t>
+              <a:t>Monday, December 2, 2024</a:t>
             </a:fld>
             <a:endParaRPr lang="en-US"/>
           </a:p>
@@ -2422,7 +2429,7 @@
           <a:p>
             <a:fld id="{B7F5FDCC-6AAC-4A08-B9E0-3793AB5E64C3}" type="datetime2">
               <a:rPr lang="en-US" smtClean="0"/>
-              <a:t>Saturday, November 30, 2024</a:t>
+              <a:t>Monday, December 2, 2024</a:t>
             </a:fld>
             <a:endParaRPr lang="en-US"/>
           </a:p>
@@ -2710,7 +2717,7 @@
           <a:p>
             <a:fld id="{349FE94D-439C-40F1-900E-BC07940E3988}" type="datetime2">
               <a:rPr lang="en-US" smtClean="0"/>
-              <a:t>Saturday, November 30, 2024</a:t>
+              <a:t>Monday, December 2, 2024</a:t>
             </a:fld>
             <a:endParaRPr lang="en-US"/>
           </a:p>
@@ -2998,7 +3005,7 @@
           <a:p>
             <a:fld id="{8DEA2CF1-0EB2-4673-802D-3371233E4A77}" type="datetime2">
               <a:rPr lang="en-US" smtClean="0"/>
-              <a:t>Saturday, November 30, 2024</a:t>
+              <a:t>Monday, December 2, 2024</a:t>
             </a:fld>
             <a:endParaRPr lang="en-US" dirty="0"/>
           </a:p>
@@ -3447,69 +3454,6 @@
           <a:chExt cx="0" cy="0"/>
         </a:xfrm>
       </p:grpSpPr>
-      <p:sp useBgFill="1">
-        <p:nvSpPr>
-          <p:cNvPr id="56" name="Rectangle 55">
-            <a:extLst>
-              <a:ext uri="{FF2B5EF4-FFF2-40B4-BE49-F238E27FC236}">
-                <a16:creationId xmlns:a16="http://schemas.microsoft.com/office/drawing/2014/main" id="{742DFF2D-EA41-4CBE-9659-C2917E4882E5}"/>
-              </a:ext>
-              <a:ext uri="{C183D7F6-B498-43B3-948B-1728B52AA6E4}">
-                <adec:decorative xmlns:adec="http://schemas.microsoft.com/office/drawing/2017/decorative" val="1"/>
-              </a:ext>
-            </a:extLst>
-          </p:cNvPr>
-          <p:cNvSpPr>
-            <a:spLocks noGrp="1" noRot="1" noChangeAspect="1" noMove="1" noResize="1" noEditPoints="1" noAdjustHandles="1" noChangeArrowheads="1" noChangeShapeType="1" noTextEdit="1"/>
-          </p:cNvSpPr>
-          <p:nvPr>
-            <p:extLst>
-              <p:ext uri="{386F3935-93C4-4BCD-93E2-E3B085C9AB24}">
-                <p16:designElem xmlns:p16="http://schemas.microsoft.com/office/powerpoint/2015/main" val="1"/>
-              </p:ext>
-            </p:extLst>
-          </p:nvPr>
-        </p:nvSpPr>
-        <p:spPr>
-          <a:xfrm>
-            <a:off x="0" y="0"/>
-            <a:ext cx="12192000" cy="6858000"/>
-          </a:xfrm>
-          <a:prstGeom prst="rect">
-            <a:avLst/>
-          </a:prstGeom>
-          <a:ln w="12700" cap="flat" cmpd="sng" algn="ctr">
-            <a:noFill/>
-            <a:prstDash val="solid"/>
-            <a:miter lim="800000"/>
-          </a:ln>
-          <a:effectLst/>
-        </p:spPr>
-        <p:style>
-          <a:lnRef idx="2">
-            <a:schemeClr val="accent1">
-              <a:shade val="50000"/>
-            </a:schemeClr>
-          </a:lnRef>
-          <a:fillRef idx="1">
-            <a:schemeClr val="accent1"/>
-          </a:fillRef>
-          <a:effectRef idx="0">
-            <a:schemeClr val="accent1"/>
-          </a:effectRef>
-          <a:fontRef idx="minor">
-            <a:schemeClr val="lt1"/>
-          </a:fontRef>
-        </p:style>
-        <p:txBody>
-          <a:bodyPr rtlCol="0" anchor="ctr"/>
-          <a:lstStyle/>
-          <a:p>
-            <a:pPr algn="ctr"/>
-            <a:endParaRPr lang="en-US"/>
-          </a:p>
-        </p:txBody>
-      </p:sp>
       <p:sp>
         <p:nvSpPr>
           <p:cNvPr id="3" name="Subtitle 2">
@@ -3545,7 +3489,11 @@
             </a:pPr>
             <a:r>
               <a:rPr lang="en-US" sz="2400" b="1" dirty="0"/>
-              <a:t>Milestone 1: Complete UI</a:t>
+              <a:t>Milestone 1: Complete App UI with no functionality (tabs, layouts, </a:t>
+            </a:r>
+            <a:r>
+              <a:rPr lang="en-US" sz="2400" b="1"/>
+              <a:t>CSS)</a:t>
             </a:r>
             <a:endParaRPr lang="en-US" sz="2400" dirty="0"/>
           </a:p>
@@ -3765,6 +3713,395 @@
           <a:chExt cx="0" cy="0"/>
         </a:xfrm>
       </p:grpSpPr>
+      <p:sp>
+        <p:nvSpPr>
+          <p:cNvPr id="2" name="Title 1">
+            <a:extLst>
+              <a:ext uri="{FF2B5EF4-FFF2-40B4-BE49-F238E27FC236}">
+                <a16:creationId xmlns:a16="http://schemas.microsoft.com/office/drawing/2014/main" id="{BC396729-7E16-62C4-273C-91622F24920E}"/>
+              </a:ext>
+            </a:extLst>
+          </p:cNvPr>
+          <p:cNvSpPr>
+            <a:spLocks noGrp="1"/>
+          </p:cNvSpPr>
+          <p:nvPr>
+            <p:ph type="title"/>
+          </p:nvPr>
+        </p:nvSpPr>
+        <p:spPr>
+          <a:xfrm>
+            <a:off x="720000" y="619200"/>
+            <a:ext cx="10728322" cy="1101445"/>
+          </a:xfrm>
+        </p:spPr>
+        <p:txBody>
+          <a:bodyPr>
+            <a:normAutofit/>
+          </a:bodyPr>
+          <a:lstStyle/>
+          <a:p>
+            <a:r>
+              <a:rPr lang="en-US" sz="1800" dirty="0"/>
+              <a:t>The Settings Window:</a:t>
+            </a:r>
+            <a:br>
+              <a:rPr lang="en-US" sz="1800" dirty="0"/>
+            </a:br>
+            <a:r>
+              <a:rPr lang="en-US" sz="1800" dirty="0"/>
+              <a:t>General: Most are self explanatory. App theme makes you change between Light and Dark modes, App font lets you change the font of the app.</a:t>
+            </a:r>
+            <a:br>
+              <a:rPr lang="en-US" sz="1800" dirty="0"/>
+            </a:br>
+            <a:r>
+              <a:rPr lang="en-US" sz="1800" dirty="0"/>
+              <a:t>Notifications: Are explained in the bubbles.</a:t>
+            </a:r>
+          </a:p>
+        </p:txBody>
+      </p:sp>
+      <p:pic>
+        <p:nvPicPr>
+          <p:cNvPr id="5" name="Picture 4">
+            <a:extLst>
+              <a:ext uri="{FF2B5EF4-FFF2-40B4-BE49-F238E27FC236}">
+                <a16:creationId xmlns:a16="http://schemas.microsoft.com/office/drawing/2014/main" id="{F4974479-2EB1-8F0C-6CC4-7BCA4001D9D1}"/>
+              </a:ext>
+            </a:extLst>
+          </p:cNvPr>
+          <p:cNvPicPr>
+            <a:picLocks noChangeAspect="1"/>
+          </p:cNvPicPr>
+          <p:nvPr/>
+        </p:nvPicPr>
+        <p:blipFill>
+          <a:blip r:embed="rId2"/>
+          <a:stretch>
+            <a:fillRect/>
+          </a:stretch>
+        </p:blipFill>
+        <p:spPr>
+          <a:xfrm>
+            <a:off x="1392782" y="2030757"/>
+            <a:ext cx="4273140" cy="4559754"/>
+          </a:xfrm>
+          <a:prstGeom prst="rect">
+            <a:avLst/>
+          </a:prstGeom>
+        </p:spPr>
+      </p:pic>
+      <p:pic>
+        <p:nvPicPr>
+          <p:cNvPr id="7" name="Picture 6">
+            <a:extLst>
+              <a:ext uri="{FF2B5EF4-FFF2-40B4-BE49-F238E27FC236}">
+                <a16:creationId xmlns:a16="http://schemas.microsoft.com/office/drawing/2014/main" id="{F26611CF-8A4F-0C86-B75B-2D7D9FB3F0CD}"/>
+              </a:ext>
+            </a:extLst>
+          </p:cNvPr>
+          <p:cNvPicPr>
+            <a:picLocks noChangeAspect="1"/>
+          </p:cNvPicPr>
+          <p:nvPr/>
+        </p:nvPicPr>
+        <p:blipFill>
+          <a:blip r:embed="rId3"/>
+          <a:stretch>
+            <a:fillRect/>
+          </a:stretch>
+        </p:blipFill>
+        <p:spPr>
+          <a:xfrm>
+            <a:off x="6084161" y="2059435"/>
+            <a:ext cx="4273140" cy="4531076"/>
+          </a:xfrm>
+          <a:prstGeom prst="rect">
+            <a:avLst/>
+          </a:prstGeom>
+        </p:spPr>
+      </p:pic>
+      <p:sp>
+        <p:nvSpPr>
+          <p:cNvPr id="8" name="Speech Bubble: Oval 7">
+            <a:extLst>
+              <a:ext uri="{FF2B5EF4-FFF2-40B4-BE49-F238E27FC236}">
+                <a16:creationId xmlns:a16="http://schemas.microsoft.com/office/drawing/2014/main" id="{B8716B18-5239-524A-59CB-2D4BC8A5AF75}"/>
+              </a:ext>
+            </a:extLst>
+          </p:cNvPr>
+          <p:cNvSpPr/>
+          <p:nvPr/>
+        </p:nvSpPr>
+        <p:spPr>
+          <a:xfrm>
+            <a:off x="7678993" y="2674374"/>
+            <a:ext cx="4273139" cy="560439"/>
+          </a:xfrm>
+          <a:prstGeom prst="wedgeEllipseCallout">
+            <a:avLst>
+              <a:gd name="adj1" fmla="val -51731"/>
+              <a:gd name="adj2" fmla="val 38816"/>
+            </a:avLst>
+          </a:prstGeom>
+        </p:spPr>
+        <p:style>
+          <a:lnRef idx="2">
+            <a:schemeClr val="accent6"/>
+          </a:lnRef>
+          <a:fillRef idx="1">
+            <a:schemeClr val="lt1"/>
+          </a:fillRef>
+          <a:effectRef idx="0">
+            <a:schemeClr val="accent6"/>
+          </a:effectRef>
+          <a:fontRef idx="minor">
+            <a:schemeClr val="dk1"/>
+          </a:fontRef>
+        </p:style>
+        <p:txBody>
+          <a:bodyPr rtlCol="0" anchor="ctr"/>
+          <a:lstStyle/>
+          <a:p>
+            <a:pPr algn="ctr"/>
+            <a:r>
+              <a:rPr lang="en-US" sz="1600" dirty="0"/>
+              <a:t>Set a time for a notification on the task’s due day.</a:t>
+            </a:r>
+          </a:p>
+        </p:txBody>
+      </p:sp>
+      <p:sp>
+        <p:nvSpPr>
+          <p:cNvPr id="9" name="Speech Bubble: Oval 8">
+            <a:extLst>
+              <a:ext uri="{FF2B5EF4-FFF2-40B4-BE49-F238E27FC236}">
+                <a16:creationId xmlns:a16="http://schemas.microsoft.com/office/drawing/2014/main" id="{2F79F461-6FA4-8723-FEFB-3B4C1E5DD739}"/>
+              </a:ext>
+            </a:extLst>
+          </p:cNvPr>
+          <p:cNvSpPr/>
+          <p:nvPr/>
+        </p:nvSpPr>
+        <p:spPr>
+          <a:xfrm>
+            <a:off x="8239433" y="3849752"/>
+            <a:ext cx="3952568" cy="997551"/>
+          </a:xfrm>
+          <a:prstGeom prst="wedgeEllipseCallout">
+            <a:avLst>
+              <a:gd name="adj1" fmla="val -43149"/>
+              <a:gd name="adj2" fmla="val 47506"/>
+            </a:avLst>
+          </a:prstGeom>
+        </p:spPr>
+        <p:style>
+          <a:lnRef idx="2">
+            <a:schemeClr val="accent6"/>
+          </a:lnRef>
+          <a:fillRef idx="1">
+            <a:schemeClr val="lt1"/>
+          </a:fillRef>
+          <a:effectRef idx="0">
+            <a:schemeClr val="accent6"/>
+          </a:effectRef>
+          <a:fontRef idx="minor">
+            <a:schemeClr val="dk1"/>
+          </a:fontRef>
+        </p:style>
+        <p:txBody>
+          <a:bodyPr rtlCol="0" anchor="ctr"/>
+          <a:lstStyle/>
+          <a:p>
+            <a:pPr algn="ctr"/>
+            <a:r>
+              <a:rPr lang="en-US" sz="1600" dirty="0"/>
+              <a:t>Set a reminder to remind you before a task’s due date (in hours)</a:t>
+            </a:r>
+          </a:p>
+        </p:txBody>
+      </p:sp>
+      <p:sp>
+        <p:nvSpPr>
+          <p:cNvPr id="10" name="Speech Bubble: Oval 9">
+            <a:extLst>
+              <a:ext uri="{FF2B5EF4-FFF2-40B4-BE49-F238E27FC236}">
+                <a16:creationId xmlns:a16="http://schemas.microsoft.com/office/drawing/2014/main" id="{9812E324-4589-DB40-DF72-2EFD45920845}"/>
+              </a:ext>
+            </a:extLst>
+          </p:cNvPr>
+          <p:cNvSpPr/>
+          <p:nvPr/>
+        </p:nvSpPr>
+        <p:spPr>
+          <a:xfrm>
+            <a:off x="8420365" y="4935794"/>
+            <a:ext cx="3260358" cy="737841"/>
+          </a:xfrm>
+          <a:prstGeom prst="wedgeEllipseCallout">
+            <a:avLst>
+              <a:gd name="adj1" fmla="val -69975"/>
+              <a:gd name="adj2" fmla="val 4674"/>
+            </a:avLst>
+          </a:prstGeom>
+        </p:spPr>
+        <p:style>
+          <a:lnRef idx="2">
+            <a:schemeClr val="accent6"/>
+          </a:lnRef>
+          <a:fillRef idx="1">
+            <a:schemeClr val="lt1"/>
+          </a:fillRef>
+          <a:effectRef idx="0">
+            <a:schemeClr val="accent6"/>
+          </a:effectRef>
+          <a:fontRef idx="minor">
+            <a:schemeClr val="dk1"/>
+          </a:fontRef>
+        </p:style>
+        <p:txBody>
+          <a:bodyPr rtlCol="0" anchor="ctr"/>
+          <a:lstStyle/>
+          <a:p>
+            <a:pPr algn="ctr"/>
+            <a:r>
+              <a:rPr lang="en-US" sz="1600" dirty="0"/>
+              <a:t>Enable/Disable the above reminder</a:t>
+            </a:r>
+          </a:p>
+        </p:txBody>
+      </p:sp>
+      <p:sp>
+        <p:nvSpPr>
+          <p:cNvPr id="12" name="Speech Bubble: Oval 11">
+            <a:extLst>
+              <a:ext uri="{FF2B5EF4-FFF2-40B4-BE49-F238E27FC236}">
+                <a16:creationId xmlns:a16="http://schemas.microsoft.com/office/drawing/2014/main" id="{F44B4E5C-FDD1-3184-D527-24055C260358}"/>
+              </a:ext>
+            </a:extLst>
+          </p:cNvPr>
+          <p:cNvSpPr/>
+          <p:nvPr/>
+        </p:nvSpPr>
+        <p:spPr>
+          <a:xfrm>
+            <a:off x="8420365" y="4935794"/>
+            <a:ext cx="3260358" cy="737841"/>
+          </a:xfrm>
+          <a:prstGeom prst="wedgeEllipseCallout">
+            <a:avLst>
+              <a:gd name="adj1" fmla="val -71181"/>
+              <a:gd name="adj2" fmla="val 51314"/>
+            </a:avLst>
+          </a:prstGeom>
+        </p:spPr>
+        <p:style>
+          <a:lnRef idx="2">
+            <a:schemeClr val="accent6"/>
+          </a:lnRef>
+          <a:fillRef idx="1">
+            <a:schemeClr val="lt1"/>
+          </a:fillRef>
+          <a:effectRef idx="0">
+            <a:schemeClr val="accent6"/>
+          </a:effectRef>
+          <a:fontRef idx="minor">
+            <a:schemeClr val="dk1"/>
+          </a:fontRef>
+        </p:style>
+        <p:txBody>
+          <a:bodyPr rtlCol="0" anchor="ctr"/>
+          <a:lstStyle/>
+          <a:p>
+            <a:pPr algn="ctr"/>
+            <a:r>
+              <a:rPr lang="en-US" sz="1600" dirty="0"/>
+              <a:t>Enable/Disable the above reminder</a:t>
+            </a:r>
+          </a:p>
+        </p:txBody>
+      </p:sp>
+      <p:sp>
+        <p:nvSpPr>
+          <p:cNvPr id="13" name="Speech Bubble: Oval 12">
+            <a:extLst>
+              <a:ext uri="{FF2B5EF4-FFF2-40B4-BE49-F238E27FC236}">
+                <a16:creationId xmlns:a16="http://schemas.microsoft.com/office/drawing/2014/main" id="{86E2EFC7-C454-32CB-FEFC-A53DF11B4A66}"/>
+              </a:ext>
+            </a:extLst>
+          </p:cNvPr>
+          <p:cNvSpPr/>
+          <p:nvPr/>
+        </p:nvSpPr>
+        <p:spPr>
+          <a:xfrm>
+            <a:off x="8691774" y="5762126"/>
+            <a:ext cx="3260358" cy="737840"/>
+          </a:xfrm>
+          <a:prstGeom prst="wedgeEllipseCallout">
+            <a:avLst>
+              <a:gd name="adj1" fmla="val -61229"/>
+              <a:gd name="adj2" fmla="val -7319"/>
+            </a:avLst>
+          </a:prstGeom>
+        </p:spPr>
+        <p:style>
+          <a:lnRef idx="2">
+            <a:schemeClr val="accent6"/>
+          </a:lnRef>
+          <a:fillRef idx="1">
+            <a:schemeClr val="lt1"/>
+          </a:fillRef>
+          <a:effectRef idx="0">
+            <a:schemeClr val="accent6"/>
+          </a:effectRef>
+          <a:fontRef idx="minor">
+            <a:schemeClr val="dk1"/>
+          </a:fontRef>
+        </p:style>
+        <p:txBody>
+          <a:bodyPr rtlCol="0" anchor="ctr"/>
+          <a:lstStyle/>
+          <a:p>
+            <a:pPr algn="ctr"/>
+            <a:r>
+              <a:rPr lang="en-US" sz="1600" dirty="0"/>
+              <a:t>Reminds you if the app is minimized and timer is up.</a:t>
+            </a:r>
+          </a:p>
+        </p:txBody>
+      </p:sp>
+    </p:spTree>
+    <p:extLst>
+      <p:ext uri="{BB962C8B-B14F-4D97-AF65-F5344CB8AC3E}">
+        <p14:creationId xmlns:p14="http://schemas.microsoft.com/office/powerpoint/2010/main" val="2793346259"/>
+      </p:ext>
+    </p:extLst>
+  </p:cSld>
+  <p:clrMapOvr>
+    <a:masterClrMapping/>
+  </p:clrMapOvr>
+</p:sld>
+</file>
+
+<file path=ppt/slides/slide11.xml><?xml version="1.0" encoding="utf-8"?>
+<p:sld xmlns:a="http://schemas.openxmlformats.org/drawingml/2006/main" xmlns:r="http://schemas.openxmlformats.org/officeDocument/2006/relationships" xmlns:p="http://schemas.openxmlformats.org/presentationml/2006/main">
+  <p:cSld>
+    <p:spTree>
+      <p:nvGrpSpPr>
+        <p:cNvPr id="1" name=""/>
+        <p:cNvGrpSpPr/>
+        <p:nvPr/>
+      </p:nvGrpSpPr>
+      <p:grpSpPr>
+        <a:xfrm>
+          <a:off x="0" y="0"/>
+          <a:ext cx="0" cy="0"/>
+          <a:chOff x="0" y="0"/>
+          <a:chExt cx="0" cy="0"/>
+        </a:xfrm>
+      </p:grpSpPr>
       <p:pic>
         <p:nvPicPr>
           <p:cNvPr id="8" name="Picture 7">
@@ -3808,7 +4145,523 @@
 </p:sld>
 </file>
 
+<file path=ppt/slides/slide12.xml><?xml version="1.0" encoding="utf-8"?>
+<p:sld xmlns:a="http://schemas.openxmlformats.org/drawingml/2006/main" xmlns:r="http://schemas.openxmlformats.org/officeDocument/2006/relationships" xmlns:p="http://schemas.openxmlformats.org/presentationml/2006/main">
+  <p:cSld>
+    <p:spTree>
+      <p:nvGrpSpPr>
+        <p:cNvPr id="1" name=""/>
+        <p:cNvGrpSpPr/>
+        <p:nvPr/>
+      </p:nvGrpSpPr>
+      <p:grpSpPr>
+        <a:xfrm>
+          <a:off x="0" y="0"/>
+          <a:ext cx="0" cy="0"/>
+          <a:chOff x="0" y="0"/>
+          <a:chExt cx="0" cy="0"/>
+        </a:xfrm>
+      </p:grpSpPr>
+      <p:sp>
+        <p:nvSpPr>
+          <p:cNvPr id="2" name="Title 1">
+            <a:extLst>
+              <a:ext uri="{FF2B5EF4-FFF2-40B4-BE49-F238E27FC236}">
+                <a16:creationId xmlns:a16="http://schemas.microsoft.com/office/drawing/2014/main" id="{EDAF9775-3A07-D50E-0982-F1DD4C4FEA0C}"/>
+              </a:ext>
+            </a:extLst>
+          </p:cNvPr>
+          <p:cNvSpPr>
+            <a:spLocks noGrp="1"/>
+          </p:cNvSpPr>
+          <p:nvPr>
+            <p:ph type="title"/>
+          </p:nvPr>
+        </p:nvSpPr>
+        <p:spPr>
+          <a:xfrm>
+            <a:off x="720000" y="619200"/>
+            <a:ext cx="10728322" cy="826142"/>
+          </a:xfrm>
+        </p:spPr>
+        <p:txBody>
+          <a:bodyPr>
+            <a:noAutofit/>
+          </a:bodyPr>
+          <a:lstStyle/>
+          <a:p>
+            <a:r>
+              <a:rPr lang="en-US" sz="2800" b="1" dirty="0"/>
+              <a:t>External links to code:</a:t>
+            </a:r>
+            <a:br>
+              <a:rPr lang="en-US" sz="2800" b="1" dirty="0"/>
+            </a:br>
+            <a:endParaRPr lang="en-US" sz="2800" b="1" dirty="0"/>
+          </a:p>
+        </p:txBody>
+      </p:sp>
+      <p:sp>
+        <p:nvSpPr>
+          <p:cNvPr id="4" name="Title 1">
+            <a:extLst>
+              <a:ext uri="{FF2B5EF4-FFF2-40B4-BE49-F238E27FC236}">
+                <a16:creationId xmlns:a16="http://schemas.microsoft.com/office/drawing/2014/main" id="{C14BA2A1-BE65-BA14-7F73-C45DFC1F6295}"/>
+              </a:ext>
+            </a:extLst>
+          </p:cNvPr>
+          <p:cNvSpPr txBox="1">
+            <a:spLocks/>
+          </p:cNvSpPr>
+          <p:nvPr/>
+        </p:nvSpPr>
+        <p:spPr>
+          <a:xfrm>
+            <a:off x="720000" y="1268361"/>
+            <a:ext cx="10728322" cy="4970439"/>
+          </a:xfrm>
+          <a:prstGeom prst="rect">
+            <a:avLst/>
+          </a:prstGeom>
+        </p:spPr>
+        <p:txBody>
+          <a:bodyPr vert="horz" wrap="square" lIns="0" tIns="0" rIns="0" bIns="0" rtlCol="0" anchor="t" anchorCtr="0">
+            <a:normAutofit fontScale="97500"/>
+          </a:bodyPr>
+          <a:lstStyle>
+            <a:lvl1pPr algn="l" defTabSz="914400" rtl="0" eaLnBrk="1" latinLnBrk="0" hangingPunct="1">
+              <a:lnSpc>
+                <a:spcPct val="100000"/>
+              </a:lnSpc>
+              <a:spcBef>
+                <a:spcPct val="0"/>
+              </a:spcBef>
+              <a:buNone/>
+              <a:defRPr sz="3200" kern="1200" cap="none" baseline="0">
+                <a:solidFill>
+                  <a:schemeClr val="tx1"/>
+                </a:solidFill>
+                <a:latin typeface="+mj-lt"/>
+                <a:ea typeface="+mj-ea"/>
+                <a:cs typeface="+mj-cs"/>
+              </a:defRPr>
+            </a:lvl1pPr>
+          </a:lstStyle>
+          <a:p>
+            <a:pPr marL="0" indent="0">
+              <a:buNone/>
+            </a:pPr>
+            <a:r>
+              <a:rPr lang="en-US" sz="2400" dirty="0"/>
+              <a:t>Currently our </a:t>
+            </a:r>
+            <a:r>
+              <a:rPr lang="en-US" sz="2400" dirty="0" err="1"/>
+              <a:t>Github</a:t>
+            </a:r>
+            <a:r>
+              <a:rPr lang="en-US" sz="2400" dirty="0"/>
+              <a:t> repo is private until we finish, so I’m providing a </a:t>
+            </a:r>
+            <a:r>
+              <a:rPr lang="en-US" sz="2400" dirty="0" err="1"/>
+              <a:t>mediafire</a:t>
+            </a:r>
+            <a:r>
+              <a:rPr lang="en-US" sz="2400" dirty="0"/>
+              <a:t> link of the code.</a:t>
+            </a:r>
+          </a:p>
+          <a:p>
+            <a:pPr marL="0" indent="0">
+              <a:buNone/>
+            </a:pPr>
+            <a:endParaRPr lang="en-US" sz="2400" dirty="0"/>
+          </a:p>
+          <a:p>
+            <a:pPr marL="0" indent="0">
+              <a:buNone/>
+            </a:pPr>
+            <a:r>
+              <a:rPr lang="en-US" sz="2400" dirty="0"/>
+              <a:t>Link: </a:t>
+            </a:r>
+            <a:r>
+              <a:rPr lang="en-US" sz="2400" dirty="0">
+                <a:hlinkClick r:id="rId2"/>
+              </a:rPr>
+              <a:t>https://www.mediafire.com/file/c46wm8rf26spbp1/Task_Management_App.zip/file</a:t>
+            </a:r>
+            <a:endParaRPr lang="en-US" sz="2400" dirty="0"/>
+          </a:p>
+          <a:p>
+            <a:pPr marL="0" indent="0">
+              <a:buNone/>
+            </a:pPr>
+            <a:endParaRPr lang="en-US" sz="2400" dirty="0"/>
+          </a:p>
+          <a:p>
+            <a:pPr marL="0" indent="0">
+              <a:buNone/>
+            </a:pPr>
+            <a:r>
+              <a:rPr lang="en-US" sz="2400" dirty="0"/>
+              <a:t>Steps to run app:</a:t>
+            </a:r>
+          </a:p>
+          <a:p>
+            <a:pPr marL="0" indent="0">
+              <a:buNone/>
+            </a:pPr>
+            <a:endParaRPr lang="en-US" sz="2400" dirty="0"/>
+          </a:p>
+          <a:p>
+            <a:pPr marL="0" indent="0">
+              <a:buNone/>
+            </a:pPr>
+            <a:r>
+              <a:rPr lang="en-US" sz="2400" dirty="0"/>
+              <a:t>1- Install the following python library by running the following line in a terminal:</a:t>
+            </a:r>
+          </a:p>
+          <a:p>
+            <a:pPr marL="0" indent="0">
+              <a:buNone/>
+            </a:pPr>
+            <a:r>
+              <a:rPr lang="en-US" sz="2400" dirty="0"/>
+              <a:t>	pip install pyqt5</a:t>
+            </a:r>
+          </a:p>
+          <a:p>
+            <a:pPr marL="0" indent="0">
+              <a:buNone/>
+            </a:pPr>
+            <a:r>
+              <a:rPr lang="en-US" sz="2400" dirty="0"/>
+              <a:t>2- Run the app by running the file “main.py” using a python interpreter.</a:t>
+            </a:r>
+          </a:p>
+        </p:txBody>
+      </p:sp>
+    </p:spTree>
+    <p:extLst>
+      <p:ext uri="{BB962C8B-B14F-4D97-AF65-F5344CB8AC3E}">
+        <p14:creationId xmlns:p14="http://schemas.microsoft.com/office/powerpoint/2010/main" val="1824263733"/>
+      </p:ext>
+    </p:extLst>
+  </p:cSld>
+  <p:clrMapOvr>
+    <a:masterClrMapping/>
+  </p:clrMapOvr>
+</p:sld>
+</file>
+
 <file path=ppt/slides/slide2.xml><?xml version="1.0" encoding="utf-8"?>
+<p:sld xmlns:a="http://schemas.openxmlformats.org/drawingml/2006/main" xmlns:r="http://schemas.openxmlformats.org/officeDocument/2006/relationships" xmlns:p="http://schemas.openxmlformats.org/presentationml/2006/main">
+  <p:cSld>
+    <p:spTree>
+      <p:nvGrpSpPr>
+        <p:cNvPr id="1" name=""/>
+        <p:cNvGrpSpPr/>
+        <p:nvPr/>
+      </p:nvGrpSpPr>
+      <p:grpSpPr>
+        <a:xfrm>
+          <a:off x="0" y="0"/>
+          <a:ext cx="0" cy="0"/>
+          <a:chOff x="0" y="0"/>
+          <a:chExt cx="0" cy="0"/>
+        </a:xfrm>
+      </p:grpSpPr>
+      <p:sp>
+        <p:nvSpPr>
+          <p:cNvPr id="2" name="Title 1">
+            <a:extLst>
+              <a:ext uri="{FF2B5EF4-FFF2-40B4-BE49-F238E27FC236}">
+                <a16:creationId xmlns:a16="http://schemas.microsoft.com/office/drawing/2014/main" id="{34AF5912-91BF-FCD1-4C9C-C27926EF6028}"/>
+              </a:ext>
+            </a:extLst>
+          </p:cNvPr>
+          <p:cNvSpPr>
+            <a:spLocks noGrp="1"/>
+          </p:cNvSpPr>
+          <p:nvPr>
+            <p:ph type="title"/>
+          </p:nvPr>
+        </p:nvSpPr>
+        <p:spPr>
+          <a:xfrm>
+            <a:off x="720000" y="619201"/>
+            <a:ext cx="10728322" cy="658994"/>
+          </a:xfrm>
+        </p:spPr>
+        <p:txBody>
+          <a:bodyPr>
+            <a:normAutofit/>
+          </a:bodyPr>
+          <a:lstStyle/>
+          <a:p>
+            <a:r>
+              <a:rPr lang="en-US" sz="2800" dirty="0"/>
+              <a:t>List of accomplished tasks:</a:t>
+            </a:r>
+          </a:p>
+        </p:txBody>
+      </p:sp>
+      <p:graphicFrame>
+        <p:nvGraphicFramePr>
+          <p:cNvPr id="4" name="Content Placeholder 3">
+            <a:extLst>
+              <a:ext uri="{FF2B5EF4-FFF2-40B4-BE49-F238E27FC236}">
+                <a16:creationId xmlns:a16="http://schemas.microsoft.com/office/drawing/2014/main" id="{51BF5AE0-8B21-7172-813E-2D4A3A9A484B}"/>
+              </a:ext>
+            </a:extLst>
+          </p:cNvPr>
+          <p:cNvGraphicFramePr>
+            <a:graphicFrameLocks noGrp="1"/>
+          </p:cNvGraphicFramePr>
+          <p:nvPr>
+            <p:ph idx="1"/>
+            <p:extLst>
+              <p:ext uri="{D42A27DB-BD31-4B8C-83A1-F6EECF244321}">
+                <p14:modId xmlns:p14="http://schemas.microsoft.com/office/powerpoint/2010/main" val="2904415945"/>
+              </p:ext>
+            </p:extLst>
+          </p:nvPr>
+        </p:nvGraphicFramePr>
+        <p:xfrm>
+          <a:off x="828881" y="1278195"/>
+          <a:ext cx="10802680" cy="3942080"/>
+        </p:xfrm>
+        <a:graphic>
+          <a:graphicData uri="http://schemas.openxmlformats.org/drawingml/2006/table">
+            <a:tbl>
+              <a:tblPr firstRow="1" bandRow="1">
+                <a:tableStyleId>{F5AB1C69-6EDB-4FF4-983F-18BD219EF322}</a:tableStyleId>
+              </a:tblPr>
+              <a:tblGrid>
+                <a:gridCol w="10802680">
+                  <a:extLst>
+                    <a:ext uri="{9D8B030D-6E8A-4147-A177-3AD203B41FA5}">
+                      <a16:colId xmlns:a16="http://schemas.microsoft.com/office/drawing/2014/main" val="2860093460"/>
+                    </a:ext>
+                  </a:extLst>
+                </a:gridCol>
+              </a:tblGrid>
+              <a:tr h="174196">
+                <a:tc>
+                  <a:txBody>
+                    <a:bodyPr/>
+                    <a:lstStyle/>
+                    <a:p>
+                      <a:pPr algn="ctr"/>
+                      <a:r>
+                        <a:rPr lang="en-US" dirty="0"/>
+                        <a:t>App UI with no functionality, only the minimum functionality for the GUI to work</a:t>
+                      </a:r>
+                    </a:p>
+                  </a:txBody>
+                  <a:tcPr/>
+                </a:tc>
+                <a:extLst>
+                  <a:ext uri="{0D108BD9-81ED-4DB2-BD59-A6C34878D82A}">
+                    <a16:rowId xmlns:a16="http://schemas.microsoft.com/office/drawing/2014/main" val="1184762718"/>
+                  </a:ext>
+                </a:extLst>
+              </a:tr>
+              <a:tr h="370840">
+                <a:tc>
+                  <a:txBody>
+                    <a:bodyPr/>
+                    <a:lstStyle/>
+                    <a:p>
+                      <a:r>
+                        <a:rPr lang="en-US" dirty="0"/>
+                        <a:t>Created 4 tabs: Tasks and Events, Calendar, Study Techniques, and Tasks Progress</a:t>
+                      </a:r>
+                    </a:p>
+                  </a:txBody>
+                  <a:tcPr/>
+                </a:tc>
+                <a:extLst>
+                  <a:ext uri="{0D108BD9-81ED-4DB2-BD59-A6C34878D82A}">
+                    <a16:rowId xmlns:a16="http://schemas.microsoft.com/office/drawing/2014/main" val="4212961458"/>
+                  </a:ext>
+                </a:extLst>
+              </a:tr>
+              <a:tr h="370840">
+                <a:tc>
+                  <a:txBody>
+                    <a:bodyPr/>
+                    <a:lstStyle/>
+                    <a:p>
+                      <a:r>
+                        <a:rPr lang="en-US" dirty="0"/>
+                        <a:t>Created a settings window: Change tasks/events preferences and change Theme which can be font or GUI, switching between light and dark.</a:t>
+                      </a:r>
+                    </a:p>
+                  </a:txBody>
+                  <a:tcPr/>
+                </a:tc>
+                <a:extLst>
+                  <a:ext uri="{0D108BD9-81ED-4DB2-BD59-A6C34878D82A}">
+                    <a16:rowId xmlns:a16="http://schemas.microsoft.com/office/drawing/2014/main" val="20153436"/>
+                  </a:ext>
+                </a:extLst>
+              </a:tr>
+              <a:tr h="370840">
+                <a:tc>
+                  <a:txBody>
+                    <a:bodyPr/>
+                    <a:lstStyle/>
+                    <a:p>
+                      <a:r>
+                        <a:rPr lang="en-US" dirty="0"/>
+                        <a:t>Tasks and Events Tab: Add a task/event with an “Add” button, making a window appear that the user input all the info about the task/event. Currently only adding a task work, but you can’t input any info yet, just for showcase. A button for search and a button for sort.</a:t>
+                      </a:r>
+                    </a:p>
+                  </a:txBody>
+                  <a:tcPr/>
+                </a:tc>
+                <a:extLst>
+                  <a:ext uri="{0D108BD9-81ED-4DB2-BD59-A6C34878D82A}">
+                    <a16:rowId xmlns:a16="http://schemas.microsoft.com/office/drawing/2014/main" val="2846204468"/>
+                  </a:ext>
+                </a:extLst>
+              </a:tr>
+              <a:tr h="370840">
+                <a:tc>
+                  <a:txBody>
+                    <a:bodyPr/>
+                    <a:lstStyle/>
+                    <a:p>
+                      <a:r>
+                        <a:rPr lang="en-US" dirty="0"/>
+                        <a:t>Calendar Tab: All tasks and events will appear here. No functionality yet.</a:t>
+                      </a:r>
+                    </a:p>
+                  </a:txBody>
+                  <a:tcPr/>
+                </a:tc>
+                <a:extLst>
+                  <a:ext uri="{0D108BD9-81ED-4DB2-BD59-A6C34878D82A}">
+                    <a16:rowId xmlns:a16="http://schemas.microsoft.com/office/drawing/2014/main" val="3666726240"/>
+                  </a:ext>
+                </a:extLst>
+              </a:tr>
+              <a:tr h="370840">
+                <a:tc>
+                  <a:txBody>
+                    <a:bodyPr/>
+                    <a:lstStyle/>
+                    <a:p>
+                      <a:r>
+                        <a:rPr lang="en-US" dirty="0"/>
+                        <a:t>Study Techniques Tab: An area to help study/focus, has a drop box for the user to choose the study technique, and a Start button, Stop, and Reset button. No functionality yet.</a:t>
+                      </a:r>
+                    </a:p>
+                  </a:txBody>
+                  <a:tcPr/>
+                </a:tc>
+                <a:extLst>
+                  <a:ext uri="{0D108BD9-81ED-4DB2-BD59-A6C34878D82A}">
+                    <a16:rowId xmlns:a16="http://schemas.microsoft.com/office/drawing/2014/main" val="1429567353"/>
+                  </a:ext>
+                </a:extLst>
+              </a:tr>
+              <a:tr h="370840">
+                <a:tc>
+                  <a:txBody>
+                    <a:bodyPr/>
+                    <a:lstStyle/>
+                    <a:p>
+                      <a:r>
+                        <a:rPr lang="en-US" dirty="0"/>
+                        <a:t>Tasks Progress: Shows all completed and left tasks over the current week and over the previous month. No functionality yet.</a:t>
+                      </a:r>
+                    </a:p>
+                  </a:txBody>
+                  <a:tcPr/>
+                </a:tc>
+                <a:extLst>
+                  <a:ext uri="{0D108BD9-81ED-4DB2-BD59-A6C34878D82A}">
+                    <a16:rowId xmlns:a16="http://schemas.microsoft.com/office/drawing/2014/main" val="641496626"/>
+                  </a:ext>
+                </a:extLst>
+              </a:tr>
+            </a:tbl>
+          </a:graphicData>
+        </a:graphic>
+      </p:graphicFrame>
+      <p:sp>
+        <p:nvSpPr>
+          <p:cNvPr id="6" name="Title 1">
+            <a:extLst>
+              <a:ext uri="{FF2B5EF4-FFF2-40B4-BE49-F238E27FC236}">
+                <a16:creationId xmlns:a16="http://schemas.microsoft.com/office/drawing/2014/main" id="{979895F6-0C14-77A8-B6D1-A0ABE55F003E}"/>
+              </a:ext>
+            </a:extLst>
+          </p:cNvPr>
+          <p:cNvSpPr txBox="1">
+            <a:spLocks/>
+          </p:cNvSpPr>
+          <p:nvPr/>
+        </p:nvSpPr>
+        <p:spPr>
+          <a:xfrm>
+            <a:off x="828881" y="5549772"/>
+            <a:ext cx="10728322" cy="658994"/>
+          </a:xfrm>
+          <a:prstGeom prst="rect">
+            <a:avLst/>
+          </a:prstGeom>
+        </p:spPr>
+        <p:txBody>
+          <a:bodyPr vert="horz" wrap="square" lIns="0" tIns="0" rIns="0" bIns="0" rtlCol="0" anchor="t" anchorCtr="0">
+            <a:normAutofit/>
+          </a:bodyPr>
+          <a:lstStyle>
+            <a:lvl1pPr algn="l" defTabSz="914400" rtl="0" eaLnBrk="1" latinLnBrk="0" hangingPunct="1">
+              <a:lnSpc>
+                <a:spcPct val="100000"/>
+              </a:lnSpc>
+              <a:spcBef>
+                <a:spcPct val="0"/>
+              </a:spcBef>
+              <a:buNone/>
+              <a:defRPr sz="3200" kern="1200" cap="none" baseline="0">
+                <a:solidFill>
+                  <a:schemeClr val="tx1"/>
+                </a:solidFill>
+                <a:latin typeface="+mj-lt"/>
+                <a:ea typeface="+mj-ea"/>
+                <a:cs typeface="+mj-cs"/>
+              </a:defRPr>
+            </a:lvl1pPr>
+          </a:lstStyle>
+          <a:p>
+            <a:r>
+              <a:rPr lang="en-US" sz="1800" dirty="0"/>
+              <a:t>More in depth in the upcoming screenshots of the app.</a:t>
+            </a:r>
+          </a:p>
+        </p:txBody>
+      </p:sp>
+    </p:spTree>
+    <p:extLst>
+      <p:ext uri="{BB962C8B-B14F-4D97-AF65-F5344CB8AC3E}">
+        <p14:creationId xmlns:p14="http://schemas.microsoft.com/office/powerpoint/2010/main" val="2819397834"/>
+      </p:ext>
+    </p:extLst>
+  </p:cSld>
+  <p:clrMapOvr>
+    <a:masterClrMapping/>
+  </p:clrMapOvr>
+</p:sld>
+</file>
+
+<file path=ppt/slides/slide3.xml><?xml version="1.0" encoding="utf-8"?>
 <p:sld xmlns:a="http://schemas.openxmlformats.org/drawingml/2006/main" xmlns:r="http://schemas.openxmlformats.org/officeDocument/2006/relationships" xmlns:p="http://schemas.openxmlformats.org/presentationml/2006/main">
   <p:cSld>
     <p:spTree>
@@ -3953,7 +4806,7 @@
 </p:sld>
 </file>
 
-<file path=ppt/slides/slide3.xml><?xml version="1.0" encoding="utf-8"?>
+<file path=ppt/slides/slide4.xml><?xml version="1.0" encoding="utf-8"?>
 <p:sld xmlns:a="http://schemas.openxmlformats.org/drawingml/2006/main" xmlns:r="http://schemas.openxmlformats.org/officeDocument/2006/relationships" xmlns:p="http://schemas.openxmlformats.org/presentationml/2006/main">
   <p:cSld>
     <p:spTree>
@@ -4110,7 +4963,7 @@
 </p:sld>
 </file>
 
-<file path=ppt/slides/slide4.xml><?xml version="1.0" encoding="utf-8"?>
+<file path=ppt/slides/slide5.xml><?xml version="1.0" encoding="utf-8"?>
 <p:sld xmlns:a="http://schemas.openxmlformats.org/drawingml/2006/main" xmlns:r="http://schemas.openxmlformats.org/officeDocument/2006/relationships" xmlns:p="http://schemas.openxmlformats.org/presentationml/2006/main">
   <p:cSld>
     <p:spTree>
@@ -4370,7 +5223,7 @@
 </p:sld>
 </file>
 
-<file path=ppt/slides/slide5.xml><?xml version="1.0" encoding="utf-8"?>
+<file path=ppt/slides/slide6.xml><?xml version="1.0" encoding="utf-8"?>
 <p:sld xmlns:a="http://schemas.openxmlformats.org/drawingml/2006/main" xmlns:r="http://schemas.openxmlformats.org/officeDocument/2006/relationships" xmlns:p="http://schemas.openxmlformats.org/presentationml/2006/main">
   <p:cSld>
     <p:spTree>
@@ -4485,7 +5338,7 @@
 </p:sld>
 </file>
 
-<file path=ppt/slides/slide6.xml><?xml version="1.0" encoding="utf-8"?>
+<file path=ppt/slides/slide7.xml><?xml version="1.0" encoding="utf-8"?>
 <p:sld xmlns:a="http://schemas.openxmlformats.org/drawingml/2006/main" xmlns:r="http://schemas.openxmlformats.org/officeDocument/2006/relationships" xmlns:p="http://schemas.openxmlformats.org/presentationml/2006/main">
   <p:cSld>
     <p:spTree>
@@ -4625,7 +5478,7 @@
 </p:sld>
 </file>
 
-<file path=ppt/slides/slide7.xml><?xml version="1.0" encoding="utf-8"?>
+<file path=ppt/slides/slide8.xml><?xml version="1.0" encoding="utf-8"?>
 <p:sld xmlns:a="http://schemas.openxmlformats.org/drawingml/2006/main" xmlns:r="http://schemas.openxmlformats.org/officeDocument/2006/relationships" xmlns:p="http://schemas.openxmlformats.org/presentationml/2006/main">
   <p:cSld>
     <p:spTree>
@@ -4685,7 +5538,7 @@
 </p:sld>
 </file>
 
-<file path=ppt/slides/slide8.xml><?xml version="1.0" encoding="utf-8"?>
+<file path=ppt/slides/slide9.xml><?xml version="1.0" encoding="utf-8"?>
 <p:sld xmlns:a="http://schemas.openxmlformats.org/drawingml/2006/main" xmlns:r="http://schemas.openxmlformats.org/officeDocument/2006/relationships" xmlns:p="http://schemas.openxmlformats.org/presentationml/2006/main">
   <p:cSld>
     <p:spTree>
@@ -4778,395 +5631,6 @@
     <p:extLst>
       <p:ext uri="{BB962C8B-B14F-4D97-AF65-F5344CB8AC3E}">
         <p14:creationId xmlns:p14="http://schemas.microsoft.com/office/powerpoint/2010/main" val="1111227804"/>
-      </p:ext>
-    </p:extLst>
-  </p:cSld>
-  <p:clrMapOvr>
-    <a:masterClrMapping/>
-  </p:clrMapOvr>
-</p:sld>
-</file>
-
-<file path=ppt/slides/slide9.xml><?xml version="1.0" encoding="utf-8"?>
-<p:sld xmlns:a="http://schemas.openxmlformats.org/drawingml/2006/main" xmlns:r="http://schemas.openxmlformats.org/officeDocument/2006/relationships" xmlns:p="http://schemas.openxmlformats.org/presentationml/2006/main">
-  <p:cSld>
-    <p:spTree>
-      <p:nvGrpSpPr>
-        <p:cNvPr id="1" name=""/>
-        <p:cNvGrpSpPr/>
-        <p:nvPr/>
-      </p:nvGrpSpPr>
-      <p:grpSpPr>
-        <a:xfrm>
-          <a:off x="0" y="0"/>
-          <a:ext cx="0" cy="0"/>
-          <a:chOff x="0" y="0"/>
-          <a:chExt cx="0" cy="0"/>
-        </a:xfrm>
-      </p:grpSpPr>
-      <p:sp>
-        <p:nvSpPr>
-          <p:cNvPr id="2" name="Title 1">
-            <a:extLst>
-              <a:ext uri="{FF2B5EF4-FFF2-40B4-BE49-F238E27FC236}">
-                <a16:creationId xmlns:a16="http://schemas.microsoft.com/office/drawing/2014/main" id="{BC396729-7E16-62C4-273C-91622F24920E}"/>
-              </a:ext>
-            </a:extLst>
-          </p:cNvPr>
-          <p:cNvSpPr>
-            <a:spLocks noGrp="1"/>
-          </p:cNvSpPr>
-          <p:nvPr>
-            <p:ph type="title"/>
-          </p:nvPr>
-        </p:nvSpPr>
-        <p:spPr>
-          <a:xfrm>
-            <a:off x="720000" y="619200"/>
-            <a:ext cx="10728322" cy="1101445"/>
-          </a:xfrm>
-        </p:spPr>
-        <p:txBody>
-          <a:bodyPr>
-            <a:normAutofit/>
-          </a:bodyPr>
-          <a:lstStyle/>
-          <a:p>
-            <a:r>
-              <a:rPr lang="en-US" sz="1800" dirty="0"/>
-              <a:t>The Settings Window:</a:t>
-            </a:r>
-            <a:br>
-              <a:rPr lang="en-US" sz="1800" dirty="0"/>
-            </a:br>
-            <a:r>
-              <a:rPr lang="en-US" sz="1800" dirty="0"/>
-              <a:t>General: Most are self explanatory. App theme makes you change between Light and Dark modes, App font lets you change the font of the app.</a:t>
-            </a:r>
-            <a:br>
-              <a:rPr lang="en-US" sz="1800" dirty="0"/>
-            </a:br>
-            <a:r>
-              <a:rPr lang="en-US" sz="1800" dirty="0"/>
-              <a:t>Notifications: Are explained in the bubbles.</a:t>
-            </a:r>
-          </a:p>
-        </p:txBody>
-      </p:sp>
-      <p:pic>
-        <p:nvPicPr>
-          <p:cNvPr id="5" name="Picture 4">
-            <a:extLst>
-              <a:ext uri="{FF2B5EF4-FFF2-40B4-BE49-F238E27FC236}">
-                <a16:creationId xmlns:a16="http://schemas.microsoft.com/office/drawing/2014/main" id="{F4974479-2EB1-8F0C-6CC4-7BCA4001D9D1}"/>
-              </a:ext>
-            </a:extLst>
-          </p:cNvPr>
-          <p:cNvPicPr>
-            <a:picLocks noChangeAspect="1"/>
-          </p:cNvPicPr>
-          <p:nvPr/>
-        </p:nvPicPr>
-        <p:blipFill>
-          <a:blip r:embed="rId2"/>
-          <a:stretch>
-            <a:fillRect/>
-          </a:stretch>
-        </p:blipFill>
-        <p:spPr>
-          <a:xfrm>
-            <a:off x="1392782" y="2030757"/>
-            <a:ext cx="4273140" cy="4559754"/>
-          </a:xfrm>
-          <a:prstGeom prst="rect">
-            <a:avLst/>
-          </a:prstGeom>
-        </p:spPr>
-      </p:pic>
-      <p:pic>
-        <p:nvPicPr>
-          <p:cNvPr id="7" name="Picture 6">
-            <a:extLst>
-              <a:ext uri="{FF2B5EF4-FFF2-40B4-BE49-F238E27FC236}">
-                <a16:creationId xmlns:a16="http://schemas.microsoft.com/office/drawing/2014/main" id="{F26611CF-8A4F-0C86-B75B-2D7D9FB3F0CD}"/>
-              </a:ext>
-            </a:extLst>
-          </p:cNvPr>
-          <p:cNvPicPr>
-            <a:picLocks noChangeAspect="1"/>
-          </p:cNvPicPr>
-          <p:nvPr/>
-        </p:nvPicPr>
-        <p:blipFill>
-          <a:blip r:embed="rId3"/>
-          <a:stretch>
-            <a:fillRect/>
-          </a:stretch>
-        </p:blipFill>
-        <p:spPr>
-          <a:xfrm>
-            <a:off x="6084161" y="2059435"/>
-            <a:ext cx="4273140" cy="4531076"/>
-          </a:xfrm>
-          <a:prstGeom prst="rect">
-            <a:avLst/>
-          </a:prstGeom>
-        </p:spPr>
-      </p:pic>
-      <p:sp>
-        <p:nvSpPr>
-          <p:cNvPr id="8" name="Speech Bubble: Oval 7">
-            <a:extLst>
-              <a:ext uri="{FF2B5EF4-FFF2-40B4-BE49-F238E27FC236}">
-                <a16:creationId xmlns:a16="http://schemas.microsoft.com/office/drawing/2014/main" id="{B8716B18-5239-524A-59CB-2D4BC8A5AF75}"/>
-              </a:ext>
-            </a:extLst>
-          </p:cNvPr>
-          <p:cNvSpPr/>
-          <p:nvPr/>
-        </p:nvSpPr>
-        <p:spPr>
-          <a:xfrm>
-            <a:off x="7678993" y="2674374"/>
-            <a:ext cx="4273139" cy="560439"/>
-          </a:xfrm>
-          <a:prstGeom prst="wedgeEllipseCallout">
-            <a:avLst>
-              <a:gd name="adj1" fmla="val -51731"/>
-              <a:gd name="adj2" fmla="val 38816"/>
-            </a:avLst>
-          </a:prstGeom>
-        </p:spPr>
-        <p:style>
-          <a:lnRef idx="2">
-            <a:schemeClr val="accent6"/>
-          </a:lnRef>
-          <a:fillRef idx="1">
-            <a:schemeClr val="lt1"/>
-          </a:fillRef>
-          <a:effectRef idx="0">
-            <a:schemeClr val="accent6"/>
-          </a:effectRef>
-          <a:fontRef idx="minor">
-            <a:schemeClr val="dk1"/>
-          </a:fontRef>
-        </p:style>
-        <p:txBody>
-          <a:bodyPr rtlCol="0" anchor="ctr"/>
-          <a:lstStyle/>
-          <a:p>
-            <a:pPr algn="ctr"/>
-            <a:r>
-              <a:rPr lang="en-US" sz="1600" dirty="0"/>
-              <a:t>Set a time for a notification on the task’s due day.</a:t>
-            </a:r>
-          </a:p>
-        </p:txBody>
-      </p:sp>
-      <p:sp>
-        <p:nvSpPr>
-          <p:cNvPr id="9" name="Speech Bubble: Oval 8">
-            <a:extLst>
-              <a:ext uri="{FF2B5EF4-FFF2-40B4-BE49-F238E27FC236}">
-                <a16:creationId xmlns:a16="http://schemas.microsoft.com/office/drawing/2014/main" id="{2F79F461-6FA4-8723-FEFB-3B4C1E5DD739}"/>
-              </a:ext>
-            </a:extLst>
-          </p:cNvPr>
-          <p:cNvSpPr/>
-          <p:nvPr/>
-        </p:nvSpPr>
-        <p:spPr>
-          <a:xfrm>
-            <a:off x="8239433" y="3849752"/>
-            <a:ext cx="3952568" cy="997551"/>
-          </a:xfrm>
-          <a:prstGeom prst="wedgeEllipseCallout">
-            <a:avLst>
-              <a:gd name="adj1" fmla="val -43149"/>
-              <a:gd name="adj2" fmla="val 47506"/>
-            </a:avLst>
-          </a:prstGeom>
-        </p:spPr>
-        <p:style>
-          <a:lnRef idx="2">
-            <a:schemeClr val="accent6"/>
-          </a:lnRef>
-          <a:fillRef idx="1">
-            <a:schemeClr val="lt1"/>
-          </a:fillRef>
-          <a:effectRef idx="0">
-            <a:schemeClr val="accent6"/>
-          </a:effectRef>
-          <a:fontRef idx="minor">
-            <a:schemeClr val="dk1"/>
-          </a:fontRef>
-        </p:style>
-        <p:txBody>
-          <a:bodyPr rtlCol="0" anchor="ctr"/>
-          <a:lstStyle/>
-          <a:p>
-            <a:pPr algn="ctr"/>
-            <a:r>
-              <a:rPr lang="en-US" sz="1600" dirty="0"/>
-              <a:t>Set a reminder to remind you before a task’s due date (in hours)</a:t>
-            </a:r>
-          </a:p>
-        </p:txBody>
-      </p:sp>
-      <p:sp>
-        <p:nvSpPr>
-          <p:cNvPr id="10" name="Speech Bubble: Oval 9">
-            <a:extLst>
-              <a:ext uri="{FF2B5EF4-FFF2-40B4-BE49-F238E27FC236}">
-                <a16:creationId xmlns:a16="http://schemas.microsoft.com/office/drawing/2014/main" id="{9812E324-4589-DB40-DF72-2EFD45920845}"/>
-              </a:ext>
-            </a:extLst>
-          </p:cNvPr>
-          <p:cNvSpPr/>
-          <p:nvPr/>
-        </p:nvSpPr>
-        <p:spPr>
-          <a:xfrm>
-            <a:off x="8420365" y="4935794"/>
-            <a:ext cx="3260358" cy="737841"/>
-          </a:xfrm>
-          <a:prstGeom prst="wedgeEllipseCallout">
-            <a:avLst>
-              <a:gd name="adj1" fmla="val -69975"/>
-              <a:gd name="adj2" fmla="val 4674"/>
-            </a:avLst>
-          </a:prstGeom>
-        </p:spPr>
-        <p:style>
-          <a:lnRef idx="2">
-            <a:schemeClr val="accent6"/>
-          </a:lnRef>
-          <a:fillRef idx="1">
-            <a:schemeClr val="lt1"/>
-          </a:fillRef>
-          <a:effectRef idx="0">
-            <a:schemeClr val="accent6"/>
-          </a:effectRef>
-          <a:fontRef idx="minor">
-            <a:schemeClr val="dk1"/>
-          </a:fontRef>
-        </p:style>
-        <p:txBody>
-          <a:bodyPr rtlCol="0" anchor="ctr"/>
-          <a:lstStyle/>
-          <a:p>
-            <a:pPr algn="ctr"/>
-            <a:r>
-              <a:rPr lang="en-US" sz="1600" dirty="0"/>
-              <a:t>Enable/Disable the above reminder</a:t>
-            </a:r>
-          </a:p>
-        </p:txBody>
-      </p:sp>
-      <p:sp>
-        <p:nvSpPr>
-          <p:cNvPr id="12" name="Speech Bubble: Oval 11">
-            <a:extLst>
-              <a:ext uri="{FF2B5EF4-FFF2-40B4-BE49-F238E27FC236}">
-                <a16:creationId xmlns:a16="http://schemas.microsoft.com/office/drawing/2014/main" id="{F44B4E5C-FDD1-3184-D527-24055C260358}"/>
-              </a:ext>
-            </a:extLst>
-          </p:cNvPr>
-          <p:cNvSpPr/>
-          <p:nvPr/>
-        </p:nvSpPr>
-        <p:spPr>
-          <a:xfrm>
-            <a:off x="8420365" y="4935794"/>
-            <a:ext cx="3260358" cy="737841"/>
-          </a:xfrm>
-          <a:prstGeom prst="wedgeEllipseCallout">
-            <a:avLst>
-              <a:gd name="adj1" fmla="val -71181"/>
-              <a:gd name="adj2" fmla="val 51314"/>
-            </a:avLst>
-          </a:prstGeom>
-        </p:spPr>
-        <p:style>
-          <a:lnRef idx="2">
-            <a:schemeClr val="accent6"/>
-          </a:lnRef>
-          <a:fillRef idx="1">
-            <a:schemeClr val="lt1"/>
-          </a:fillRef>
-          <a:effectRef idx="0">
-            <a:schemeClr val="accent6"/>
-          </a:effectRef>
-          <a:fontRef idx="minor">
-            <a:schemeClr val="dk1"/>
-          </a:fontRef>
-        </p:style>
-        <p:txBody>
-          <a:bodyPr rtlCol="0" anchor="ctr"/>
-          <a:lstStyle/>
-          <a:p>
-            <a:pPr algn="ctr"/>
-            <a:r>
-              <a:rPr lang="en-US" sz="1600" dirty="0"/>
-              <a:t>Enable/Disable the above reminder</a:t>
-            </a:r>
-          </a:p>
-        </p:txBody>
-      </p:sp>
-      <p:sp>
-        <p:nvSpPr>
-          <p:cNvPr id="13" name="Speech Bubble: Oval 12">
-            <a:extLst>
-              <a:ext uri="{FF2B5EF4-FFF2-40B4-BE49-F238E27FC236}">
-                <a16:creationId xmlns:a16="http://schemas.microsoft.com/office/drawing/2014/main" id="{86E2EFC7-C454-32CB-FEFC-A53DF11B4A66}"/>
-              </a:ext>
-            </a:extLst>
-          </p:cNvPr>
-          <p:cNvSpPr/>
-          <p:nvPr/>
-        </p:nvSpPr>
-        <p:spPr>
-          <a:xfrm>
-            <a:off x="8691774" y="5762126"/>
-            <a:ext cx="3260358" cy="737840"/>
-          </a:xfrm>
-          <a:prstGeom prst="wedgeEllipseCallout">
-            <a:avLst>
-              <a:gd name="adj1" fmla="val -61229"/>
-              <a:gd name="adj2" fmla="val -7319"/>
-            </a:avLst>
-          </a:prstGeom>
-        </p:spPr>
-        <p:style>
-          <a:lnRef idx="2">
-            <a:schemeClr val="accent6"/>
-          </a:lnRef>
-          <a:fillRef idx="1">
-            <a:schemeClr val="lt1"/>
-          </a:fillRef>
-          <a:effectRef idx="0">
-            <a:schemeClr val="accent6"/>
-          </a:effectRef>
-          <a:fontRef idx="minor">
-            <a:schemeClr val="dk1"/>
-          </a:fontRef>
-        </p:style>
-        <p:txBody>
-          <a:bodyPr rtlCol="0" anchor="ctr"/>
-          <a:lstStyle/>
-          <a:p>
-            <a:pPr algn="ctr"/>
-            <a:r>
-              <a:rPr lang="en-US" sz="1600" dirty="0"/>
-              <a:t>Reminds you if the app is minimized and timer is up.</a:t>
-            </a:r>
-          </a:p>
-        </p:txBody>
-      </p:sp>
-    </p:spTree>
-    <p:extLst>
-      <p:ext uri="{BB962C8B-B14F-4D97-AF65-F5344CB8AC3E}">
-        <p14:creationId xmlns:p14="http://schemas.microsoft.com/office/powerpoint/2010/main" val="2793346259"/>
       </p:ext>
     </p:extLst>
   </p:cSld>

</xml_diff>